<commit_message>
Powerpoint überarbeitet für ideen
</commit_message>
<xml_diff>
--- a/AwesomeApp/src/Deckblatt.png.pptx
+++ b/AwesomeApp/src/Deckblatt.png.pptx
@@ -6,8 +6,9 @@
   </p:sldMasterIdLst>
   <p:sldIdLst>
     <p:sldId id="256" r:id="rId2"/>
-    <p:sldId id="257" r:id="rId3"/>
-    <p:sldId id="258" r:id="rId4"/>
+    <p:sldId id="258" r:id="rId3"/>
+    <p:sldId id="259" r:id="rId4"/>
+    <p:sldId id="260" r:id="rId5"/>
   </p:sldIdLst>
   <p:sldSz cx="12192000" cy="6858000"/>
   <p:notesSz cx="6858000" cy="9144000"/>
@@ -106,7 +107,136 @@
       </a:defRPr>
     </a:lvl9pPr>
   </p:defaultTextStyle>
+  <p:extLst>
+    <p:ext uri="{EFAFB233-063F-42B5-8137-9DF3F51BA10A}">
+      <p15:sldGuideLst xmlns:p15="http://schemas.microsoft.com/office/powerpoint/2012/main"/>
+    </p:ext>
+  </p:extLst>
 </p:presentation>
+</file>
+
+<file path=ppt/authors.xml><?xml version="1.0" encoding="utf-8"?>
+<p188:authorLst xmlns:a="http://schemas.openxmlformats.org/drawingml/2006/main" xmlns:r="http://schemas.openxmlformats.org/officeDocument/2006/relationships" xmlns:p188="http://schemas.microsoft.com/office/powerpoint/2018/8/main">
+  <p188:author id="{0121A070-9841-6694-2AE6-5B8AD8E6A8BC}" name="ms005316@mslic.uni-kl.de" initials="LU" userId="S::ms005316@mslic.uni-kl.de::b4329b41-892a-4dda-820b-e009283586af" providerId="AD"/>
+</p188:authorLst>
+</file>
+
+<file path=ppt/comments/modernComment_100_7BFFFD8E.xml><?xml version="1.0" encoding="utf-8"?>
+<p188:cmLst xmlns:a="http://schemas.openxmlformats.org/drawingml/2006/main" xmlns:r="http://schemas.openxmlformats.org/officeDocument/2006/relationships" xmlns:p188="http://schemas.microsoft.com/office/powerpoint/2018/8/main">
+  <p188:cm id="{347CBDDD-4F3C-48A1-8057-4805591B1D42}" authorId="{0121A070-9841-6694-2AE6-5B8AD8E6A8BC}" created="2024-02-27T15:24:11.155">
+    <pc:sldMkLst xmlns:pc="http://schemas.microsoft.com/office/powerpoint/2013/main/command">
+      <pc:docMk/>
+      <pc:sldMk cId="2080374158" sldId="256"/>
+    </pc:sldMkLst>
+    <p188:txBody>
+      <a:bodyPr/>
+      <a:lstStyle/>
+      <a:p>
+        <a:r>
+          <a:rPr lang="de-DE"/>
+          <a:t>Bild muss eingefügt werden in Deckblatt-Datei </a:t>
+        </a:r>
+      </a:p>
+    </p188:txBody>
+  </p188:cm>
+  <p188:cm id="{E5BABB18-780C-4307-8BDB-84A0BC000CF3}" authorId="{0121A070-9841-6694-2AE6-5B8AD8E6A8BC}" created="2024-02-27T19:12:10.926">
+    <pc:sldMkLst xmlns:pc="http://schemas.microsoft.com/office/powerpoint/2013/main/command">
+      <pc:docMk/>
+      <pc:sldMk cId="2080374158" sldId="256"/>
+    </pc:sldMkLst>
+    <p188:txBody>
+      <a:bodyPr/>
+      <a:lstStyle/>
+      <a:p>
+        <a:r>
+          <a:rPr lang="de-DE"/>
+          <a:t>Überlegung: Bildergalerie als Code? Mit eingegliedertem Button? Code schon in VSCode aber nicht funktioniernd </a:t>
+        </a:r>
+      </a:p>
+    </p188:txBody>
+  </p188:cm>
+  <p188:cm id="{01A790D1-E6B7-451C-AAD7-4D23FA1005A9}" authorId="{0121A070-9841-6694-2AE6-5B8AD8E6A8BC}" created="2024-02-27T20:03:49.884">
+    <pc:sldMkLst xmlns:pc="http://schemas.microsoft.com/office/powerpoint/2013/main/command">
+      <pc:docMk/>
+      <pc:sldMk cId="2080374158" sldId="256"/>
+    </pc:sldMkLst>
+    <p188:txBody>
+      <a:bodyPr/>
+      <a:lstStyle/>
+      <a:p>
+        <a:r>
+          <a:rPr lang="de-DE"/>
+          <a:t>Der Startbutton muss auf die nächste Folie zugreifen heißt start muss mit denen Verknüpft sein 
+</a:t>
+        </a:r>
+      </a:p>
+    </p188:txBody>
+  </p188:cm>
+</p188:cmLst>
+</file>
+
+<file path=ppt/comments/modernComment_102_745C6ADD.xml><?xml version="1.0" encoding="utf-8"?>
+<p188:cmLst xmlns:a="http://schemas.openxmlformats.org/drawingml/2006/main" xmlns:r="http://schemas.openxmlformats.org/officeDocument/2006/relationships" xmlns:p188="http://schemas.microsoft.com/office/powerpoint/2018/8/main">
+  <p188:cm id="{5080B7DB-304C-4520-B998-E0E5E93A2A4B}" authorId="{0121A070-9841-6694-2AE6-5B8AD8E6A8BC}" created="2024-02-27T15:12:40.492">
+    <pc:sldMkLst xmlns:pc="http://schemas.microsoft.com/office/powerpoint/2013/main/command">
+      <pc:docMk/>
+      <pc:sldMk cId="1952213725" sldId="258"/>
+    </pc:sldMkLst>
+    <p188:txBody>
+      <a:bodyPr/>
+      <a:lstStyle/>
+      <a:p>
+        <a:r>
+          <a:rPr lang="de-DE"/>
+          <a:t>Die Buttons sind mit Hover Effekt in bunt. </a:t>
+        </a:r>
+      </a:p>
+    </p188:txBody>
+  </p188:cm>
+</p188:cmLst>
+</file>
+
+<file path=ppt/comments/modernComment_103_106A491F.xml><?xml version="1.0" encoding="utf-8"?>
+<p188:cmLst xmlns:a="http://schemas.openxmlformats.org/drawingml/2006/main" xmlns:r="http://schemas.openxmlformats.org/officeDocument/2006/relationships" xmlns:p188="http://schemas.microsoft.com/office/powerpoint/2018/8/main">
+  <p188:cm id="{28BFE0A7-1642-47A9-9AAE-700AB08FA8DB}" authorId="{0121A070-9841-6694-2AE6-5B8AD8E6A8BC}" created="2024-02-27T15:16:58.826">
+    <pc:sldMkLst xmlns:pc="http://schemas.microsoft.com/office/powerpoint/2013/main/command">
+      <pc:docMk/>
+      <pc:sldMk cId="275400991" sldId="259"/>
+    </pc:sldMkLst>
+    <p188:txBody>
+      <a:bodyPr/>
+      <a:lstStyle/>
+      <a:p>
+        <a:r>
+          <a:rPr lang="de-DE"/>
+          <a:t>Oben Links wird Counter angzeigt oder was auch immer je nachdem wo man sich befindet. Die anderen zwei sind auch zu sehen aber kleiner damit man nicht verwirrt ist. In der Mitte der Counter so wie er jetzt ist </a:t>
+        </a:r>
+      </a:p>
+    </p188:txBody>
+  </p188:cm>
+</p188:cmLst>
+</file>
+
+<file path=ppt/comments/modernComment_104_258D4ABA.xml><?xml version="1.0" encoding="utf-8"?>
+<p188:cmLst xmlns:a="http://schemas.openxmlformats.org/drawingml/2006/main" xmlns:r="http://schemas.openxmlformats.org/officeDocument/2006/relationships" xmlns:p188="http://schemas.microsoft.com/office/powerpoint/2018/8/main">
+  <p188:cm id="{A8DA3095-81C9-4C6E-B194-EDC22AA45B4C}" authorId="{0121A070-9841-6694-2AE6-5B8AD8E6A8BC}" created="2024-02-27T15:21:42.390">
+    <ac:deMkLst xmlns:ac="http://schemas.microsoft.com/office/drawing/2013/main/command">
+      <pc:docMk xmlns:pc="http://schemas.microsoft.com/office/powerpoint/2013/main/command"/>
+      <pc:sldMk xmlns:pc="http://schemas.microsoft.com/office/powerpoint/2013/main/command" cId="630016698" sldId="260"/>
+      <ac:graphicFrameMk id="5" creationId="{651E8F45-9B06-63E1-515F-B0CD1A8A8E23}"/>
+    </ac:deMkLst>
+    <p188:txBody>
+      <a:bodyPr/>
+      <a:lstStyle/>
+      <a:p>
+        <a:r>
+          <a:rPr lang="de-DE"/>
+          <a:t>Die Liste hat wie eine Art Tabelle wo man die Aufgaben eintragen kann und eintrage kann ob erledigt. Dafür brauch man buttons</a:t>
+        </a:r>
+      </a:p>
+    </p188:txBody>
+  </p188:cm>
+</p188:cmLst>
 </file>
 
 <file path=ppt/slideLayouts/slideLayout1.xml><?xml version="1.0" encoding="utf-8"?>
@@ -3309,6 +3439,14 @@
 <file path=ppt/slides/slide1.xml><?xml version="1.0" encoding="utf-8"?>
 <p:sld xmlns:a="http://schemas.openxmlformats.org/drawingml/2006/main" xmlns:r="http://schemas.openxmlformats.org/officeDocument/2006/relationships" xmlns:p="http://schemas.openxmlformats.org/presentationml/2006/main">
   <p:cSld>
+    <p:bg>
+      <p:bgPr>
+        <a:solidFill>
+          <a:schemeClr val="tx1"/>
+        </a:solidFill>
+        <a:effectLst/>
+      </p:bgPr>
+    </p:bg>
     <p:spTree>
       <p:nvGrpSpPr>
         <p:cNvPr id="1" name=""/>
@@ -3325,47 +3463,6 @@
       </p:grpSpPr>
       <p:pic>
         <p:nvPicPr>
-          <p:cNvPr id="5" name="Grafik 4">
-            <a:extLst>
-              <a:ext uri="{FF2B5EF4-FFF2-40B4-BE49-F238E27FC236}">
-                <a16:creationId xmlns:a16="http://schemas.microsoft.com/office/drawing/2014/main" id="{9210BA0C-C9F7-7627-F71F-20836033133D}"/>
-              </a:ext>
-            </a:extLst>
-          </p:cNvPr>
-          <p:cNvPicPr>
-            <a:picLocks noChangeAspect="1"/>
-          </p:cNvPicPr>
-          <p:nvPr/>
-        </p:nvPicPr>
-        <p:blipFill rotWithShape="1">
-          <a:blip r:embed="rId2">
-            <a:extLst>
-              <a:ext uri="{BEBA8EAE-BF5A-486C-A8C5-ECC9F3942E4B}">
-                <a14:imgProps xmlns:a14="http://schemas.microsoft.com/office/drawing/2010/main">
-                  <a14:imgLayer r:embed="rId3">
-                    <a14:imgEffect>
-                      <a14:sharpenSoften amount="50000"/>
-                    </a14:imgEffect>
-                  </a14:imgLayer>
-                </a14:imgProps>
-              </a:ext>
-            </a:extLst>
-          </a:blip>
-          <a:srcRect t="18966"/>
-          <a:stretch/>
-        </p:blipFill>
-        <p:spPr>
-          <a:xfrm>
-            <a:off x="4353250" y="1961593"/>
-            <a:ext cx="2621966" cy="2934814"/>
-          </a:xfrm>
-          <a:prstGeom prst="rect">
-            <a:avLst/>
-          </a:prstGeom>
-        </p:spPr>
-      </p:pic>
-      <p:pic>
-        <p:nvPicPr>
           <p:cNvPr id="7" name="Grafik 6">
             <a:extLst>
               <a:ext uri="{FF2B5EF4-FFF2-40B4-BE49-F238E27FC236}">
@@ -3379,11 +3476,11 @@
           <p:nvPr/>
         </p:nvPicPr>
         <p:blipFill>
-          <a:blip r:embed="rId4">
+          <a:blip r:embed="rId3">
             <a:extLst>
               <a:ext uri="{BEBA8EAE-BF5A-486C-A8C5-ECC9F3942E4B}">
                 <a14:imgProps xmlns:a14="http://schemas.microsoft.com/office/drawing/2010/main">
-                  <a14:imgLayer r:embed="rId5">
+                  <a14:imgLayer r:embed="rId4">
                     <a14:imgEffect>
                       <a14:sharpenSoften amount="50000"/>
                     </a14:imgEffect>
@@ -3421,11 +3518,11 @@
           <p:nvPr/>
         </p:nvPicPr>
         <p:blipFill>
-          <a:blip r:embed="rId6">
+          <a:blip r:embed="rId5">
             <a:extLst>
               <a:ext uri="{BEBA8EAE-BF5A-486C-A8C5-ECC9F3942E4B}">
                 <a14:imgProps xmlns:a14="http://schemas.microsoft.com/office/drawing/2010/main">
-                  <a14:imgLayer r:embed="rId7">
+                  <a14:imgLayer r:embed="rId6">
                     <a14:imgEffect>
                       <a14:sharpenSoften amount="50000"/>
                     </a14:imgEffect>
@@ -3463,11 +3560,11 @@
           <p:nvPr/>
         </p:nvPicPr>
         <p:blipFill>
-          <a:blip r:embed="rId8">
+          <a:blip r:embed="rId7">
             <a:extLst>
               <a:ext uri="{BEBA8EAE-BF5A-486C-A8C5-ECC9F3942E4B}">
                 <a14:imgProps xmlns:a14="http://schemas.microsoft.com/office/drawing/2010/main">
-                  <a14:imgLayer r:embed="rId9">
+                  <a14:imgLayer r:embed="rId8">
                     <a14:imgEffect>
                       <a14:sharpenSoften amount="50000"/>
                     </a14:imgEffect>
@@ -3505,11 +3602,11 @@
           <p:nvPr/>
         </p:nvPicPr>
         <p:blipFill>
-          <a:blip r:embed="rId10">
+          <a:blip r:embed="rId9">
             <a:extLst>
               <a:ext uri="{BEBA8EAE-BF5A-486C-A8C5-ECC9F3942E4B}">
                 <a14:imgProps xmlns:a14="http://schemas.microsoft.com/office/drawing/2010/main">
-                  <a14:imgLayer r:embed="rId11">
+                  <a14:imgLayer r:embed="rId10">
                     <a14:imgEffect>
                       <a14:sharpenSoften amount="50000"/>
                     </a14:imgEffect>
@@ -3547,11 +3644,11 @@
           <p:nvPr/>
         </p:nvPicPr>
         <p:blipFill>
-          <a:blip r:embed="rId12">
+          <a:blip r:embed="rId11">
             <a:extLst>
               <a:ext uri="{BEBA8EAE-BF5A-486C-A8C5-ECC9F3942E4B}">
                 <a14:imgProps xmlns:a14="http://schemas.microsoft.com/office/drawing/2010/main">
-                  <a14:imgLayer r:embed="rId13">
+                  <a14:imgLayer r:embed="rId12">
                     <a14:imgEffect>
                       <a14:sharpenSoften amount="50000"/>
                     </a14:imgEffect>
@@ -3589,7 +3686,7 @@
           <p:nvPr/>
         </p:nvPicPr>
         <p:blipFill>
-          <a:blip r:embed="rId14"/>
+          <a:blip r:embed="rId13"/>
           <a:stretch>
             <a:fillRect/>
           </a:stretch>
@@ -3619,7 +3716,7 @@
           <p:nvPr/>
         </p:nvPicPr>
         <p:blipFill>
-          <a:blip r:embed="rId15"/>
+          <a:blip r:embed="rId14"/>
           <a:stretch>
             <a:fillRect/>
           </a:stretch>
@@ -3649,7 +3746,7 @@
           <p:nvPr/>
         </p:nvPicPr>
         <p:blipFill rotWithShape="1">
-          <a:blip r:embed="rId16"/>
+          <a:blip r:embed="rId15"/>
           <a:srcRect t="54360"/>
           <a:stretch/>
         </p:blipFill>
@@ -3678,11 +3775,11 @@
           <p:nvPr/>
         </p:nvPicPr>
         <p:blipFill>
-          <a:blip r:embed="rId17">
+          <a:blip r:embed="rId16">
             <a:extLst>
               <a:ext uri="{BEBA8EAE-BF5A-486C-A8C5-ECC9F3942E4B}">
                 <a14:imgProps xmlns:a14="http://schemas.microsoft.com/office/drawing/2010/main">
-                  <a14:imgLayer r:embed="rId18">
+                  <a14:imgLayer r:embed="rId17">
                     <a14:imgEffect>
                       <a14:sharpenSoften amount="50000"/>
                     </a14:imgEffect>
@@ -3720,11 +3817,11 @@
           <p:nvPr/>
         </p:nvPicPr>
         <p:blipFill>
-          <a:blip r:embed="rId19">
+          <a:blip r:embed="rId18">
             <a:extLst>
               <a:ext uri="{BEBA8EAE-BF5A-486C-A8C5-ECC9F3942E4B}">
                 <a14:imgProps xmlns:a14="http://schemas.microsoft.com/office/drawing/2010/main">
-                  <a14:imgLayer r:embed="rId20">
+                  <a14:imgLayer r:embed="rId19">
                     <a14:imgEffect>
                       <a14:sharpenSoften amount="50000"/>
                     </a14:imgEffect>
@@ -3762,11 +3859,11 @@
           <p:nvPr/>
         </p:nvPicPr>
         <p:blipFill>
-          <a:blip r:embed="rId21">
+          <a:blip r:embed="rId20">
             <a:extLst>
               <a:ext uri="{BEBA8EAE-BF5A-486C-A8C5-ECC9F3942E4B}">
                 <a14:imgProps xmlns:a14="http://schemas.microsoft.com/office/drawing/2010/main">
-                  <a14:imgLayer r:embed="rId22">
+                  <a14:imgLayer r:embed="rId21">
                     <a14:imgEffect>
                       <a14:sharpenSoften amount="50000"/>
                     </a14:imgEffect>
@@ -3804,7 +3901,7 @@
           <p:nvPr/>
         </p:nvPicPr>
         <p:blipFill>
-          <a:blip r:embed="rId23"/>
+          <a:blip r:embed="rId22"/>
           <a:stretch>
             <a:fillRect/>
           </a:stretch>
@@ -3834,7 +3931,7 @@
           <p:nvPr/>
         </p:nvPicPr>
         <p:blipFill>
-          <a:blip r:embed="rId24"/>
+          <a:blip r:embed="rId23"/>
           <a:stretch>
             <a:fillRect/>
           </a:stretch>
@@ -3864,11 +3961,11 @@
           <p:nvPr/>
         </p:nvPicPr>
         <p:blipFill>
-          <a:blip r:embed="rId25">
+          <a:blip r:embed="rId24">
             <a:extLst>
               <a:ext uri="{BEBA8EAE-BF5A-486C-A8C5-ECC9F3942E4B}">
                 <a14:imgProps xmlns:a14="http://schemas.microsoft.com/office/drawing/2010/main">
-                  <a14:imgLayer r:embed="rId26">
+                  <a14:imgLayer r:embed="rId25">
                     <a14:imgEffect>
                       <a14:sharpenSoften amount="50000"/>
                     </a14:imgEffect>
@@ -3906,11 +4003,11 @@
           <p:nvPr/>
         </p:nvPicPr>
         <p:blipFill>
-          <a:blip r:embed="rId27">
+          <a:blip r:embed="rId26">
             <a:extLst>
               <a:ext uri="{BEBA8EAE-BF5A-486C-A8C5-ECC9F3942E4B}">
                 <a14:imgProps xmlns:a14="http://schemas.microsoft.com/office/drawing/2010/main">
-                  <a14:imgLayer r:embed="rId28">
+                  <a14:imgLayer r:embed="rId27">
                     <a14:imgEffect>
                       <a14:sharpenSoften amount="50000"/>
                     </a14:imgEffect>
@@ -3933,6 +4030,45 @@
           </a:prstGeom>
         </p:spPr>
       </p:pic>
+      <p:sp>
+        <p:nvSpPr>
+          <p:cNvPr id="3" name="Textfeld 2">
+            <a:extLst>
+              <a:ext uri="{FF2B5EF4-FFF2-40B4-BE49-F238E27FC236}">
+                <a16:creationId xmlns:a16="http://schemas.microsoft.com/office/drawing/2014/main" id="{1CF14969-B784-61CC-F882-B565AEF11B43}"/>
+              </a:ext>
+            </a:extLst>
+          </p:cNvPr>
+          <p:cNvSpPr txBox="1"/>
+          <p:nvPr/>
+        </p:nvSpPr>
+        <p:spPr>
+          <a:xfrm>
+            <a:off x="5322405" y="3126802"/>
+            <a:ext cx="923925" cy="369332"/>
+          </a:xfrm>
+          <a:prstGeom prst="rect">
+            <a:avLst/>
+          </a:prstGeom>
+          <a:noFill/>
+        </p:spPr>
+        <p:txBody>
+          <a:bodyPr wrap="square" rtlCol="0">
+            <a:spAutoFit/>
+          </a:bodyPr>
+          <a:lstStyle/>
+          <a:p>
+            <a:r>
+              <a:rPr lang="de-DE" dirty="0">
+                <a:solidFill>
+                  <a:schemeClr val="bg1"/>
+                </a:solidFill>
+              </a:rPr>
+              <a:t>Start</a:t>
+            </a:r>
+          </a:p>
+        </p:txBody>
+      </p:sp>
     </p:spTree>
     <p:extLst>
       <p:ext uri="{BB962C8B-B14F-4D97-AF65-F5344CB8AC3E}">
@@ -3943,6 +4079,11 @@
   <p:clrMapOvr>
     <a:masterClrMapping/>
   </p:clrMapOvr>
+  <p:extLst>
+    <p:ext uri="{6950BFC3-D8DA-4A85-94F7-54DA5524770B}">
+      <p188:commentRel xmlns:p188="http://schemas.microsoft.com/office/powerpoint/2018/8/main" r:id="rId2"/>
+    </p:ext>
+  </p:extLst>
 </p:sld>
 </file>
 
@@ -3952,7 +4093,7 @@
     <p:bg>
       <p:bgPr>
         <a:solidFill>
-          <a:schemeClr val="bg1"/>
+          <a:schemeClr val="tx1"/>
         </a:solidFill>
         <a:effectLst/>
       </p:bgPr>
@@ -3976,7 +4117,7 @@
           <p:cNvPr id="2" name="Textfeld 1">
             <a:extLst>
               <a:ext uri="{FF2B5EF4-FFF2-40B4-BE49-F238E27FC236}">
-                <a16:creationId xmlns:a16="http://schemas.microsoft.com/office/drawing/2014/main" id="{57C84CA1-28EE-5372-C738-6AAFFCC2C3FD}"/>
+                <a16:creationId xmlns:a16="http://schemas.microsoft.com/office/drawing/2014/main" id="{829D6048-F144-CD70-8B00-6E81914FC78C}"/>
               </a:ext>
             </a:extLst>
           </p:cNvPr>
@@ -3985,8 +4126,8 @@
         </p:nvSpPr>
         <p:spPr>
           <a:xfrm>
-            <a:off x="1524000" y="2801816"/>
-            <a:ext cx="4138246" cy="369332"/>
+            <a:off x="3305175" y="2514600"/>
+            <a:ext cx="2314575" cy="369332"/>
           </a:xfrm>
           <a:prstGeom prst="rect">
             <a:avLst/>
@@ -4000,17 +4141,18 @@
           <a:lstStyle/>
           <a:p>
             <a:r>
-              <a:rPr lang="de-DE" dirty="0"/>
-              <a:t>Hier </a:t>
+              <a:rPr lang="de-DE" dirty="0" err="1">
+                <a:solidFill>
+                  <a:schemeClr val="bg1"/>
+                </a:solidFill>
+              </a:rPr>
+              <a:t>Counter</a:t>
             </a:r>
             <a:r>
               <a:rPr lang="de-DE" dirty="0" err="1"/>
-              <a:t>ToDo</a:t>
-            </a:r>
-            <a:r>
-              <a:rPr lang="de-DE" dirty="0"/>
-              <a:t> finden du wirst </a:t>
-            </a:r>
+              <a:t>r</a:t>
+            </a:r>
+            <a:endParaRPr lang="de-DE" dirty="0"/>
           </a:p>
         </p:txBody>
       </p:sp>
@@ -4019,7 +4161,7 @@
           <p:cNvPr id="3" name="Textfeld 2">
             <a:extLst>
               <a:ext uri="{FF2B5EF4-FFF2-40B4-BE49-F238E27FC236}">
-                <a16:creationId xmlns:a16="http://schemas.microsoft.com/office/drawing/2014/main" id="{DE0BDF21-DF9B-964A-60F6-F22FA938EEE7}"/>
+                <a16:creationId xmlns:a16="http://schemas.microsoft.com/office/drawing/2014/main" id="{55CFFD83-E2BE-A6D5-944F-7698A1DA0A38}"/>
               </a:ext>
             </a:extLst>
           </p:cNvPr>
@@ -4028,8 +4170,8 @@
         </p:nvSpPr>
         <p:spPr>
           <a:xfrm>
-            <a:off x="6377354" y="2801816"/>
-            <a:ext cx="4818184" cy="369332"/>
+            <a:off x="6181725" y="2514600"/>
+            <a:ext cx="2743200" cy="369332"/>
           </a:xfrm>
           <a:prstGeom prst="rect">
             <a:avLst/>
@@ -4043,8 +4185,12 @@
           <a:lstStyle/>
           <a:p>
             <a:r>
-              <a:rPr lang="de-DE" dirty="0"/>
-              <a:t>Counter du finden wirst hier </a:t>
+              <a:rPr lang="de-DE" dirty="0">
+                <a:solidFill>
+                  <a:schemeClr val="bg1"/>
+                </a:solidFill>
+              </a:rPr>
+              <a:t>To-Do-Liste</a:t>
             </a:r>
           </a:p>
         </p:txBody>
@@ -4052,19 +4198,32 @@
     </p:spTree>
     <p:extLst>
       <p:ext uri="{BB962C8B-B14F-4D97-AF65-F5344CB8AC3E}">
-        <p14:creationId xmlns:p14="http://schemas.microsoft.com/office/powerpoint/2010/main" val="3876169141"/>
+        <p14:creationId xmlns:p14="http://schemas.microsoft.com/office/powerpoint/2010/main" val="1952213725"/>
       </p:ext>
     </p:extLst>
   </p:cSld>
   <p:clrMapOvr>
     <a:masterClrMapping/>
   </p:clrMapOvr>
+  <p:extLst>
+    <p:ext uri="{6950BFC3-D8DA-4A85-94F7-54DA5524770B}">
+      <p188:commentRel xmlns:p188="http://schemas.microsoft.com/office/powerpoint/2018/8/main" r:id="rId2"/>
+    </p:ext>
+  </p:extLst>
 </p:sld>
 </file>
 
 <file path=ppt/slides/slide3.xml><?xml version="1.0" encoding="utf-8"?>
 <p:sld xmlns:a="http://schemas.openxmlformats.org/drawingml/2006/main" xmlns:r="http://schemas.openxmlformats.org/officeDocument/2006/relationships" xmlns:p="http://schemas.openxmlformats.org/presentationml/2006/main">
   <p:cSld>
+    <p:bg>
+      <p:bgPr>
+        <a:solidFill>
+          <a:schemeClr val="tx1"/>
+        </a:solidFill>
+        <a:effectLst/>
+      </p:bgPr>
+    </p:bg>
     <p:spTree>
       <p:nvGrpSpPr>
         <p:cNvPr id="1" name=""/>
@@ -4079,16 +4238,563 @@
           <a:chExt cx="0" cy="0"/>
         </a:xfrm>
       </p:grpSpPr>
+      <p:sp>
+        <p:nvSpPr>
+          <p:cNvPr id="2" name="Textfeld 1">
+            <a:extLst>
+              <a:ext uri="{FF2B5EF4-FFF2-40B4-BE49-F238E27FC236}">
+                <a16:creationId xmlns:a16="http://schemas.microsoft.com/office/drawing/2014/main" id="{737496AE-C638-C1DD-9050-D1EAA8FA11FC}"/>
+              </a:ext>
+            </a:extLst>
+          </p:cNvPr>
+          <p:cNvSpPr txBox="1"/>
+          <p:nvPr/>
+        </p:nvSpPr>
+        <p:spPr>
+          <a:xfrm>
+            <a:off x="361950" y="247650"/>
+            <a:ext cx="4486275" cy="1446550"/>
+          </a:xfrm>
+          <a:prstGeom prst="rect">
+            <a:avLst/>
+          </a:prstGeom>
+          <a:noFill/>
+        </p:spPr>
+        <p:txBody>
+          <a:bodyPr wrap="square" rtlCol="0">
+            <a:spAutoFit/>
+          </a:bodyPr>
+          <a:lstStyle/>
+          <a:p>
+            <a:r>
+              <a:rPr lang="de-DE" sz="4000" dirty="0">
+                <a:solidFill>
+                  <a:schemeClr val="bg1"/>
+                </a:solidFill>
+              </a:rPr>
+              <a:t>Counter</a:t>
+            </a:r>
+          </a:p>
+          <a:p>
+            <a:endParaRPr lang="de-DE" sz="1600" dirty="0">
+              <a:solidFill>
+                <a:schemeClr val="bg1"/>
+              </a:solidFill>
+            </a:endParaRPr>
+          </a:p>
+          <a:p>
+            <a:r>
+              <a:rPr lang="de-DE" sz="1600" dirty="0">
+                <a:solidFill>
+                  <a:schemeClr val="bg1"/>
+                </a:solidFill>
+              </a:rPr>
+              <a:t>Start</a:t>
+            </a:r>
+          </a:p>
+          <a:p>
+            <a:r>
+              <a:rPr lang="de-DE" sz="1600" dirty="0">
+                <a:solidFill>
+                  <a:schemeClr val="bg1"/>
+                </a:solidFill>
+              </a:rPr>
+              <a:t>To-Do-Liste </a:t>
+            </a:r>
+          </a:p>
+        </p:txBody>
+      </p:sp>
+      <p:sp>
+        <p:nvSpPr>
+          <p:cNvPr id="3" name="Textfeld 2">
+            <a:extLst>
+              <a:ext uri="{FF2B5EF4-FFF2-40B4-BE49-F238E27FC236}">
+                <a16:creationId xmlns:a16="http://schemas.microsoft.com/office/drawing/2014/main" id="{A46A1551-053B-4F65-9A58-7207DDBBB72D}"/>
+              </a:ext>
+            </a:extLst>
+          </p:cNvPr>
+          <p:cNvSpPr txBox="1"/>
+          <p:nvPr/>
+        </p:nvSpPr>
+        <p:spPr>
+          <a:xfrm>
+            <a:off x="3107094" y="3059668"/>
+            <a:ext cx="2388636" cy="369332"/>
+          </a:xfrm>
+          <a:prstGeom prst="rect">
+            <a:avLst/>
+          </a:prstGeom>
+          <a:noFill/>
+        </p:spPr>
+        <p:txBody>
+          <a:bodyPr wrap="square" rtlCol="0">
+            <a:spAutoFit/>
+          </a:bodyPr>
+          <a:lstStyle/>
+          <a:p>
+            <a:r>
+              <a:rPr lang="de-DE" dirty="0">
+                <a:solidFill>
+                  <a:schemeClr val="bg1"/>
+                </a:solidFill>
+              </a:rPr>
+              <a:t>Helle Seite der Macht</a:t>
+            </a:r>
+          </a:p>
+        </p:txBody>
+      </p:sp>
+      <p:sp>
+        <p:nvSpPr>
+          <p:cNvPr id="4" name="Textfeld 3">
+            <a:extLst>
+              <a:ext uri="{FF2B5EF4-FFF2-40B4-BE49-F238E27FC236}">
+                <a16:creationId xmlns:a16="http://schemas.microsoft.com/office/drawing/2014/main" id="{A01FD54A-4384-652D-D274-22D170D9D5A0}"/>
+              </a:ext>
+            </a:extLst>
+          </p:cNvPr>
+          <p:cNvSpPr txBox="1"/>
+          <p:nvPr/>
+        </p:nvSpPr>
+        <p:spPr>
+          <a:xfrm>
+            <a:off x="6484776" y="3046445"/>
+            <a:ext cx="3396343" cy="369332"/>
+          </a:xfrm>
+          <a:prstGeom prst="rect">
+            <a:avLst/>
+          </a:prstGeom>
+          <a:noFill/>
+        </p:spPr>
+        <p:txBody>
+          <a:bodyPr wrap="square" rtlCol="0">
+            <a:spAutoFit/>
+          </a:bodyPr>
+          <a:lstStyle/>
+          <a:p>
+            <a:r>
+              <a:rPr lang="de-DE" dirty="0">
+                <a:solidFill>
+                  <a:schemeClr val="bg1"/>
+                </a:solidFill>
+              </a:rPr>
+              <a:t>Dunkle Seite der Macht </a:t>
+            </a:r>
+          </a:p>
+        </p:txBody>
+      </p:sp>
+      <p:sp>
+        <p:nvSpPr>
+          <p:cNvPr id="5" name="Textfeld 4">
+            <a:extLst>
+              <a:ext uri="{FF2B5EF4-FFF2-40B4-BE49-F238E27FC236}">
+                <a16:creationId xmlns:a16="http://schemas.microsoft.com/office/drawing/2014/main" id="{E16D8205-1C82-8EFA-D115-2C3B061E78FE}"/>
+              </a:ext>
+            </a:extLst>
+          </p:cNvPr>
+          <p:cNvSpPr txBox="1"/>
+          <p:nvPr/>
+        </p:nvSpPr>
+        <p:spPr>
+          <a:xfrm>
+            <a:off x="5707225" y="2677113"/>
+            <a:ext cx="1959429" cy="369332"/>
+          </a:xfrm>
+          <a:prstGeom prst="rect">
+            <a:avLst/>
+          </a:prstGeom>
+          <a:noFill/>
+        </p:spPr>
+        <p:txBody>
+          <a:bodyPr wrap="square" rtlCol="0">
+            <a:spAutoFit/>
+          </a:bodyPr>
+          <a:lstStyle/>
+          <a:p>
+            <a:r>
+              <a:rPr lang="de-DE" dirty="0">
+                <a:solidFill>
+                  <a:schemeClr val="bg1"/>
+                </a:solidFill>
+              </a:rPr>
+              <a:t>0</a:t>
+            </a:r>
+          </a:p>
+        </p:txBody>
+      </p:sp>
     </p:spTree>
     <p:extLst>
       <p:ext uri="{BB962C8B-B14F-4D97-AF65-F5344CB8AC3E}">
-        <p14:creationId xmlns:p14="http://schemas.microsoft.com/office/powerpoint/2010/main" val="1952213725"/>
+        <p14:creationId xmlns:p14="http://schemas.microsoft.com/office/powerpoint/2010/main" val="275400991"/>
       </p:ext>
     </p:extLst>
   </p:cSld>
   <p:clrMapOvr>
     <a:masterClrMapping/>
   </p:clrMapOvr>
+  <p:extLst>
+    <p:ext uri="{6950BFC3-D8DA-4A85-94F7-54DA5524770B}">
+      <p188:commentRel xmlns:p188="http://schemas.microsoft.com/office/powerpoint/2018/8/main" r:id="rId2"/>
+    </p:ext>
+  </p:extLst>
+</p:sld>
+</file>
+
+<file path=ppt/slides/slide4.xml><?xml version="1.0" encoding="utf-8"?>
+<p:sld xmlns:a="http://schemas.openxmlformats.org/drawingml/2006/main" xmlns:r="http://schemas.openxmlformats.org/officeDocument/2006/relationships" xmlns:p="http://schemas.openxmlformats.org/presentationml/2006/main">
+  <p:cSld>
+    <p:bg>
+      <p:bgPr>
+        <a:solidFill>
+          <a:schemeClr val="tx1"/>
+        </a:solidFill>
+        <a:effectLst/>
+      </p:bgPr>
+    </p:bg>
+    <p:spTree>
+      <p:nvGrpSpPr>
+        <p:cNvPr id="1" name=""/>
+        <p:cNvGrpSpPr/>
+        <p:nvPr/>
+      </p:nvGrpSpPr>
+      <p:grpSpPr>
+        <a:xfrm>
+          <a:off x="0" y="0"/>
+          <a:ext cx="0" cy="0"/>
+          <a:chOff x="0" y="0"/>
+          <a:chExt cx="0" cy="0"/>
+        </a:xfrm>
+      </p:grpSpPr>
+      <p:sp>
+        <p:nvSpPr>
+          <p:cNvPr id="2" name="Textfeld 1">
+            <a:extLst>
+              <a:ext uri="{FF2B5EF4-FFF2-40B4-BE49-F238E27FC236}">
+                <a16:creationId xmlns:a16="http://schemas.microsoft.com/office/drawing/2014/main" id="{3DF80DBD-4600-5BF0-8184-CE9E452BD5FF}"/>
+              </a:ext>
+            </a:extLst>
+          </p:cNvPr>
+          <p:cNvSpPr txBox="1"/>
+          <p:nvPr/>
+        </p:nvSpPr>
+        <p:spPr>
+          <a:xfrm>
+            <a:off x="447675" y="228600"/>
+            <a:ext cx="3505200" cy="1938992"/>
+          </a:xfrm>
+          <a:prstGeom prst="rect">
+            <a:avLst/>
+          </a:prstGeom>
+          <a:noFill/>
+        </p:spPr>
+        <p:txBody>
+          <a:bodyPr wrap="square" rtlCol="0">
+            <a:spAutoFit/>
+          </a:bodyPr>
+          <a:lstStyle/>
+          <a:p>
+            <a:r>
+              <a:rPr lang="de-DE" sz="4000" dirty="0" err="1">
+                <a:solidFill>
+                  <a:schemeClr val="bg1"/>
+                </a:solidFill>
+              </a:rPr>
+              <a:t>TO-DO-Liste</a:t>
+            </a:r>
+            <a:endParaRPr lang="de-DE" sz="4000" dirty="0">
+              <a:solidFill>
+                <a:schemeClr val="bg1"/>
+              </a:solidFill>
+            </a:endParaRPr>
+          </a:p>
+          <a:p>
+            <a:endParaRPr lang="de-DE" sz="4000" dirty="0">
+              <a:solidFill>
+                <a:schemeClr val="bg1"/>
+              </a:solidFill>
+            </a:endParaRPr>
+          </a:p>
+          <a:p>
+            <a:r>
+              <a:rPr lang="de-DE" sz="2000" dirty="0">
+                <a:solidFill>
+                  <a:schemeClr val="bg1"/>
+                </a:solidFill>
+              </a:rPr>
+              <a:t>Start</a:t>
+            </a:r>
+          </a:p>
+          <a:p>
+            <a:r>
+              <a:rPr lang="de-DE" sz="2000" dirty="0">
+                <a:solidFill>
+                  <a:schemeClr val="bg1"/>
+                </a:solidFill>
+              </a:rPr>
+              <a:t>Counter </a:t>
+            </a:r>
+          </a:p>
+        </p:txBody>
+      </p:sp>
+      <p:graphicFrame>
+        <p:nvGraphicFramePr>
+          <p:cNvPr id="5" name="Tabelle 4">
+            <a:extLst>
+              <a:ext uri="{FF2B5EF4-FFF2-40B4-BE49-F238E27FC236}">
+                <a16:creationId xmlns:a16="http://schemas.microsoft.com/office/drawing/2014/main" id="{651E8F45-9B06-63E1-515F-B0CD1A8A8E23}"/>
+              </a:ext>
+            </a:extLst>
+          </p:cNvPr>
+          <p:cNvGraphicFramePr>
+            <a:graphicFrameLocks noGrp="1"/>
+          </p:cNvGraphicFramePr>
+          <p:nvPr>
+            <p:extLst>
+              <p:ext uri="{D42A27DB-BD31-4B8C-83A1-F6EECF244321}">
+                <p14:modId xmlns:p14="http://schemas.microsoft.com/office/powerpoint/2010/main" val="3960532937"/>
+              </p:ext>
+            </p:extLst>
+          </p:nvPr>
+        </p:nvGraphicFramePr>
+        <p:xfrm>
+          <a:off x="2032000" y="2796116"/>
+          <a:ext cx="8128000" cy="2595880"/>
+        </p:xfrm>
+        <a:graphic>
+          <a:graphicData uri="http://schemas.openxmlformats.org/drawingml/2006/table">
+            <a:tbl>
+              <a:tblPr firstRow="1" bandRow="1">
+                <a:tableStyleId>{5C22544A-7EE6-4342-B048-85BDC9FD1C3A}</a:tableStyleId>
+              </a:tblPr>
+              <a:tblGrid>
+                <a:gridCol w="4064000">
+                  <a:extLst>
+                    <a:ext uri="{9D8B030D-6E8A-4147-A177-3AD203B41FA5}">
+                      <a16:colId xmlns:a16="http://schemas.microsoft.com/office/drawing/2014/main" val="765246852"/>
+                    </a:ext>
+                  </a:extLst>
+                </a:gridCol>
+                <a:gridCol w="4064000">
+                  <a:extLst>
+                    <a:ext uri="{9D8B030D-6E8A-4147-A177-3AD203B41FA5}">
+                      <a16:colId xmlns:a16="http://schemas.microsoft.com/office/drawing/2014/main" val="1958319698"/>
+                    </a:ext>
+                  </a:extLst>
+                </a:gridCol>
+              </a:tblGrid>
+              <a:tr h="370840">
+                <a:tc>
+                  <a:txBody>
+                    <a:bodyPr/>
+                    <a:lstStyle/>
+                    <a:p>
+                      <a:r>
+                        <a:rPr lang="de-DE" dirty="0"/>
+                        <a:t>Aufgabe(n)</a:t>
+                      </a:r>
+                    </a:p>
+                  </a:txBody>
+                  <a:tcPr/>
+                </a:tc>
+                <a:tc>
+                  <a:txBody>
+                    <a:bodyPr/>
+                    <a:lstStyle/>
+                    <a:p>
+                      <a:r>
+                        <a:rPr lang="de-DE" dirty="0"/>
+                        <a:t>Erledigt? </a:t>
+                      </a:r>
+                    </a:p>
+                  </a:txBody>
+                  <a:tcPr/>
+                </a:tc>
+                <a:extLst>
+                  <a:ext uri="{0D108BD9-81ED-4DB2-BD59-A6C34878D82A}">
+                    <a16:rowId xmlns:a16="http://schemas.microsoft.com/office/drawing/2014/main" val="2612706913"/>
+                  </a:ext>
+                </a:extLst>
+              </a:tr>
+              <a:tr h="370840">
+                <a:tc>
+                  <a:txBody>
+                    <a:bodyPr/>
+                    <a:lstStyle/>
+                    <a:p>
+                      <a:endParaRPr lang="de-DE"/>
+                    </a:p>
+                  </a:txBody>
+                  <a:tcPr/>
+                </a:tc>
+                <a:tc>
+                  <a:txBody>
+                    <a:bodyPr/>
+                    <a:lstStyle/>
+                    <a:p>
+                      <a:endParaRPr lang="de-DE" dirty="0"/>
+                    </a:p>
+                  </a:txBody>
+                  <a:tcPr/>
+                </a:tc>
+                <a:extLst>
+                  <a:ext uri="{0D108BD9-81ED-4DB2-BD59-A6C34878D82A}">
+                    <a16:rowId xmlns:a16="http://schemas.microsoft.com/office/drawing/2014/main" val="2419212715"/>
+                  </a:ext>
+                </a:extLst>
+              </a:tr>
+              <a:tr h="370840">
+                <a:tc>
+                  <a:txBody>
+                    <a:bodyPr/>
+                    <a:lstStyle/>
+                    <a:p>
+                      <a:endParaRPr lang="de-DE"/>
+                    </a:p>
+                  </a:txBody>
+                  <a:tcPr/>
+                </a:tc>
+                <a:tc>
+                  <a:txBody>
+                    <a:bodyPr/>
+                    <a:lstStyle/>
+                    <a:p>
+                      <a:endParaRPr lang="de-DE"/>
+                    </a:p>
+                  </a:txBody>
+                  <a:tcPr/>
+                </a:tc>
+                <a:extLst>
+                  <a:ext uri="{0D108BD9-81ED-4DB2-BD59-A6C34878D82A}">
+                    <a16:rowId xmlns:a16="http://schemas.microsoft.com/office/drawing/2014/main" val="359048036"/>
+                  </a:ext>
+                </a:extLst>
+              </a:tr>
+              <a:tr h="370840">
+                <a:tc>
+                  <a:txBody>
+                    <a:bodyPr/>
+                    <a:lstStyle/>
+                    <a:p>
+                      <a:endParaRPr lang="de-DE"/>
+                    </a:p>
+                  </a:txBody>
+                  <a:tcPr/>
+                </a:tc>
+                <a:tc>
+                  <a:txBody>
+                    <a:bodyPr/>
+                    <a:lstStyle/>
+                    <a:p>
+                      <a:endParaRPr lang="de-DE"/>
+                    </a:p>
+                  </a:txBody>
+                  <a:tcPr/>
+                </a:tc>
+                <a:extLst>
+                  <a:ext uri="{0D108BD9-81ED-4DB2-BD59-A6C34878D82A}">
+                    <a16:rowId xmlns:a16="http://schemas.microsoft.com/office/drawing/2014/main" val="772802028"/>
+                  </a:ext>
+                </a:extLst>
+              </a:tr>
+              <a:tr h="370840">
+                <a:tc>
+                  <a:txBody>
+                    <a:bodyPr/>
+                    <a:lstStyle/>
+                    <a:p>
+                      <a:endParaRPr lang="de-DE"/>
+                    </a:p>
+                  </a:txBody>
+                  <a:tcPr/>
+                </a:tc>
+                <a:tc>
+                  <a:txBody>
+                    <a:bodyPr/>
+                    <a:lstStyle/>
+                    <a:p>
+                      <a:endParaRPr lang="de-DE"/>
+                    </a:p>
+                  </a:txBody>
+                  <a:tcPr/>
+                </a:tc>
+                <a:extLst>
+                  <a:ext uri="{0D108BD9-81ED-4DB2-BD59-A6C34878D82A}">
+                    <a16:rowId xmlns:a16="http://schemas.microsoft.com/office/drawing/2014/main" val="2110819455"/>
+                  </a:ext>
+                </a:extLst>
+              </a:tr>
+              <a:tr h="370840">
+                <a:tc>
+                  <a:txBody>
+                    <a:bodyPr/>
+                    <a:lstStyle/>
+                    <a:p>
+                      <a:endParaRPr lang="de-DE"/>
+                    </a:p>
+                  </a:txBody>
+                  <a:tcPr/>
+                </a:tc>
+                <a:tc>
+                  <a:txBody>
+                    <a:bodyPr/>
+                    <a:lstStyle/>
+                    <a:p>
+                      <a:endParaRPr lang="de-DE"/>
+                    </a:p>
+                  </a:txBody>
+                  <a:tcPr/>
+                </a:tc>
+                <a:extLst>
+                  <a:ext uri="{0D108BD9-81ED-4DB2-BD59-A6C34878D82A}">
+                    <a16:rowId xmlns:a16="http://schemas.microsoft.com/office/drawing/2014/main" val="4145555229"/>
+                  </a:ext>
+                </a:extLst>
+              </a:tr>
+              <a:tr h="370840">
+                <a:tc>
+                  <a:txBody>
+                    <a:bodyPr/>
+                    <a:lstStyle/>
+                    <a:p>
+                      <a:endParaRPr lang="de-DE"/>
+                    </a:p>
+                  </a:txBody>
+                  <a:tcPr/>
+                </a:tc>
+                <a:tc>
+                  <a:txBody>
+                    <a:bodyPr/>
+                    <a:lstStyle/>
+                    <a:p>
+                      <a:endParaRPr lang="de-DE" dirty="0"/>
+                    </a:p>
+                  </a:txBody>
+                  <a:tcPr/>
+                </a:tc>
+                <a:extLst>
+                  <a:ext uri="{0D108BD9-81ED-4DB2-BD59-A6C34878D82A}">
+                    <a16:rowId xmlns:a16="http://schemas.microsoft.com/office/drawing/2014/main" val="2571859663"/>
+                  </a:ext>
+                </a:extLst>
+              </a:tr>
+            </a:tbl>
+          </a:graphicData>
+        </a:graphic>
+      </p:graphicFrame>
+    </p:spTree>
+    <p:extLst>
+      <p:ext uri="{BB962C8B-B14F-4D97-AF65-F5344CB8AC3E}">
+        <p14:creationId xmlns:p14="http://schemas.microsoft.com/office/powerpoint/2010/main" val="630016698"/>
+      </p:ext>
+    </p:extLst>
+  </p:cSld>
+  <p:clrMapOvr>
+    <a:masterClrMapping/>
+  </p:clrMapOvr>
+  <p:extLst>
+    <p:ext uri="{6950BFC3-D8DA-4A85-94F7-54DA5524770B}">
+      <p188:commentRel xmlns:p188="http://schemas.microsoft.com/office/powerpoint/2018/8/main" r:id="rId2"/>
+    </p:ext>
+  </p:extLst>
 </p:sld>
 </file>
 

</xml_diff>